<commit_message>
docs: Update Project Proposal
</commit_message>
<xml_diff>
--- a/docs/proposal/Project Presentation.pptx
+++ b/docs/proposal/Project Presentation.pptx
@@ -3569,7 +3569,7 @@
           <a:p>
             <a:fld id="{88D38747-4367-4BD2-8D51-C97E202738E2}" type="datetime1">
               <a:rPr lang="en-US" smtClean="0"/>
-              <a:t>9/29/2025</a:t>
+              <a:t>11/11/2025</a:t>
             </a:fld>
             <a:endParaRPr lang="en-US" dirty="0"/>
           </a:p>
@@ -3874,7 +3874,7 @@
           <a:p>
             <a:fld id="{11F1B079-7EF0-44EE-B798-BCC497C9F3B2}" type="datetime1">
               <a:rPr lang="en-US" smtClean="0"/>
-              <a:t>9/29/2025</a:t>
+              <a:t>11/11/2025</a:t>
             </a:fld>
             <a:endParaRPr lang="en-US" dirty="0"/>
           </a:p>
@@ -4068,7 +4068,7 @@
           <a:p>
             <a:fld id="{28FF70A8-1D13-4657-95F0-A9EA54967B8D}" type="datetime1">
               <a:rPr lang="en-US" smtClean="0"/>
-              <a:t>9/29/2025</a:t>
+              <a:t>11/11/2025</a:t>
             </a:fld>
             <a:endParaRPr lang="en-US" dirty="0"/>
           </a:p>
@@ -4331,7 +4331,7 @@
           <a:p>
             <a:fld id="{21EB90AC-71BD-4C7F-8ACA-7B3F18292E63}" type="datetime1">
               <a:rPr lang="en-US" smtClean="0"/>
-              <a:t>9/29/2025</a:t>
+              <a:t>11/11/2025</a:t>
             </a:fld>
             <a:endParaRPr lang="en-US" dirty="0"/>
           </a:p>
@@ -4767,7 +4767,7 @@
           <a:p>
             <a:fld id="{4E6EFC2C-8905-46F0-B443-CE905B76BA01}" type="datetime1">
               <a:rPr lang="en-US" smtClean="0"/>
-              <a:t>9/29/2025</a:t>
+              <a:t>11/11/2025</a:t>
             </a:fld>
             <a:endParaRPr lang="en-US" dirty="0"/>
           </a:p>
@@ -5304,7 +5304,7 @@
           <a:p>
             <a:fld id="{D9079DC3-C9B5-499E-9140-0DC28B7074E2}" type="datetime1">
               <a:rPr lang="en-US" smtClean="0"/>
-              <a:t>9/29/2025</a:t>
+              <a:t>11/11/2025</a:t>
             </a:fld>
             <a:endParaRPr lang="en-US" dirty="0"/>
           </a:p>
@@ -6186,7 +6186,7 @@
           <a:p>
             <a:fld id="{30BB33EA-E472-4D22-9C03-A9C14AA21CED}" type="datetime1">
               <a:rPr lang="en-US" smtClean="0"/>
-              <a:t>9/29/2025</a:t>
+              <a:t>11/11/2025</a:t>
             </a:fld>
             <a:endParaRPr lang="en-US" dirty="0"/>
           </a:p>
@@ -6356,7 +6356,7 @@
           <a:p>
             <a:fld id="{73C55A3C-5767-4844-A0A3-83778C2E5409}" type="datetime1">
               <a:rPr lang="en-US" smtClean="0"/>
-              <a:t>9/29/2025</a:t>
+              <a:t>11/11/2025</a:t>
             </a:fld>
             <a:endParaRPr lang="en-US" dirty="0"/>
           </a:p>
@@ -6600,7 +6600,7 @@
           <a:p>
             <a:fld id="{CAE507A8-A5CF-4D38-AB86-7EDDA87A85D4}" type="datetime1">
               <a:rPr lang="en-US" smtClean="0"/>
-              <a:t>9/29/2025</a:t>
+              <a:t>11/11/2025</a:t>
             </a:fld>
             <a:endParaRPr lang="en-US" dirty="0"/>
           </a:p>
@@ -6842,7 +6842,7 @@
           <a:p>
             <a:fld id="{BDFCD27C-8599-43EF-BA1D-14DDC1946E06}" type="datetime1">
               <a:rPr lang="en-US" smtClean="0"/>
-              <a:t>9/29/2025</a:t>
+              <a:t>11/11/2025</a:t>
             </a:fld>
             <a:endParaRPr lang="en-US" dirty="0"/>
           </a:p>
@@ -7325,7 +7325,7 @@
           <a:p>
             <a:fld id="{49343D99-809A-49C0-96E5-4250D0B498EE}" type="datetime1">
               <a:rPr lang="en-US" smtClean="0"/>
-              <a:t>9/29/2025</a:t>
+              <a:t>11/11/2025</a:t>
             </a:fld>
             <a:endParaRPr lang="en-US" dirty="0"/>
           </a:p>
@@ -7443,7 +7443,7 @@
           <a:p>
             <a:fld id="{A143DE9B-B678-4EFB-BB7D-A4370204A0B0}" type="datetime1">
               <a:rPr lang="en-US" smtClean="0"/>
-              <a:t>9/29/2025</a:t>
+              <a:t>11/11/2025</a:t>
             </a:fld>
             <a:endParaRPr lang="en-US" dirty="0"/>
           </a:p>
@@ -7538,7 +7538,7 @@
           <a:p>
             <a:fld id="{E68812DA-F765-4142-A6A3-A8ED7235E082}" type="datetime1">
               <a:rPr lang="en-US" smtClean="0"/>
-              <a:t>9/29/2025</a:t>
+              <a:t>11/11/2025</a:t>
             </a:fld>
             <a:endParaRPr lang="en-US" dirty="0"/>
           </a:p>
@@ -7793,7 +7793,7 @@
           <a:p>
             <a:fld id="{3E0277FD-7DE6-41D4-930D-AC99F5AFE54E}" type="datetime1">
               <a:rPr lang="en-US" smtClean="0"/>
-              <a:t>9/29/2025</a:t>
+              <a:t>11/11/2025</a:t>
             </a:fld>
             <a:endParaRPr lang="en-US" dirty="0"/>
           </a:p>
@@ -8100,7 +8100,7 @@
           <a:p>
             <a:fld id="{9EA15526-7079-4B7B-987C-1B5FAE11A0FF}" type="datetime1">
               <a:rPr lang="en-US" smtClean="0"/>
-              <a:t>9/29/2025</a:t>
+              <a:t>11/11/2025</a:t>
             </a:fld>
             <a:endParaRPr lang="en-US" dirty="0"/>
           </a:p>
@@ -8335,7 +8335,7 @@
           <a:p>
             <a:fld id="{073ED0CC-082F-4160-86E5-0D6041F12778}" type="datetime1">
               <a:rPr lang="en-US" smtClean="0"/>
-              <a:t>9/29/2025</a:t>
+              <a:t>11/11/2025</a:t>
             </a:fld>
             <a:endParaRPr lang="en-US" dirty="0"/>
           </a:p>
@@ -9252,7 +9252,7 @@
           </a:effectLst>
           <a:extLst>
             <a:ext uri="{91240B29-F687-4f45-9708-019B960494DF}">
-              <a14:hiddenLine xmlns:a16="http://schemas.microsoft.com/office/drawing/2014/main" xmlns:p14="http://schemas.microsoft.com/office/powerpoint/2010/main" xmlns:a14="http://schemas.microsoft.com/office/drawing/2010/main" xmlns="" w="9525">
+              <a14:hiddenLine xmlns="" xmlns:a14="http://schemas.microsoft.com/office/drawing/2010/main" xmlns:p14="http://schemas.microsoft.com/office/powerpoint/2010/main" xmlns:a16="http://schemas.microsoft.com/office/drawing/2014/main" w="9525">
                 <a:solidFill>
                   <a:srgbClr val="000000"/>
                 </a:solidFill>
@@ -9365,16 +9365,41 @@
         </p:spPr>
         <p:txBody>
           <a:bodyPr>
-            <a:normAutofit/>
+            <a:normAutofit fontScale="70000" lnSpcReduction="20000"/>
           </a:bodyPr>
           <a:lstStyle/>
           <a:p>
             <a:pPr algn="l"/>
-            <a:endParaRPr lang="en-US" sz="2300" dirty="0">
-              <a:solidFill>
-                <a:srgbClr val="5792BA"/>
-              </a:solidFill>
-            </a:endParaRPr>
+            <a:r>
+              <a:rPr lang="en-US" sz="2300" dirty="0">
+                <a:solidFill>
+                  <a:srgbClr val="5792BA"/>
+                </a:solidFill>
+              </a:rPr>
+              <a:t>Yu Duo Zhang </a:t>
+            </a:r>
+          </a:p>
+          <a:p>
+            <a:pPr algn="l"/>
+            <a:r>
+              <a:rPr lang="en-US" sz="2300" dirty="0">
+                <a:solidFill>
+                  <a:srgbClr val="5792BA"/>
+                </a:solidFill>
+              </a:rPr>
+              <a:t>&amp; </a:t>
+            </a:r>
+          </a:p>
+          <a:p>
+            <a:pPr algn="l"/>
+            <a:r>
+              <a:rPr lang="en-US" sz="2300" dirty="0">
+                <a:solidFill>
+                  <a:srgbClr val="5792BA"/>
+                </a:solidFill>
+              </a:rPr>
+              <a:t>Yixin Liu</a:t>
+            </a:r>
           </a:p>
         </p:txBody>
       </p:sp>
@@ -10496,15 +10521,6 @@
 </file>
 
 <file path=customXml/item2.xml><?xml version="1.0" encoding="utf-8"?>
-<?mso-contentType ?>
-<FormTemplates xmlns="http://schemas.microsoft.com/sharepoint/v3/contenttype/forms">
-  <Display>DocumentLibraryForm</Display>
-  <Edit>DocumentLibraryForm</Edit>
-  <New>DocumentLibraryForm</New>
-</FormTemplates>
-</file>
-
-<file path=customXml/item3.xml><?xml version="1.0" encoding="utf-8"?>
 <ct:contentTypeSchema xmlns:ct="http://schemas.microsoft.com/office/2006/metadata/contentType" xmlns:ma="http://schemas.microsoft.com/office/2006/metadata/properties/metaAttributes" ct:_="" ma:_="" ma:contentTypeName="Document" ma:contentTypeID="0x01010079F111ED35F8CC479449609E8A0923A6" ma:contentTypeVersion="12" ma:contentTypeDescription="Create a new document." ma:contentTypeScope="" ma:versionID="a410dd7f93c95333ffa1b60ed6adedd1">
   <xsd:schema xmlns:xsd="http://www.w3.org/2001/XMLSchema" xmlns:xs="http://www.w3.org/2001/XMLSchema" xmlns:p="http://schemas.microsoft.com/office/2006/metadata/properties" xmlns:ns2="71af3243-3dd4-4a8d-8c0d-dd76da1f02a5" xmlns:ns3="16c05727-aa75-4e4a-9b5f-8a80a1165891" targetNamespace="http://schemas.microsoft.com/office/2006/metadata/properties" ma:root="true" ma:fieldsID="a936d9baba76aa3866493feff160faab" ns2:_="" ns3:_="">
     <xsd:import namespace="71af3243-3dd4-4a8d-8c0d-dd76da1f02a5"/>
@@ -10725,6 +10741,15 @@
 </ct:contentTypeSchema>
 </file>
 
+<file path=customXml/item3.xml><?xml version="1.0" encoding="utf-8"?>
+<?mso-contentType ?>
+<FormTemplates xmlns="http://schemas.microsoft.com/sharepoint/v3/contenttype/forms">
+  <Display>DocumentLibraryForm</Display>
+  <Edit>DocumentLibraryForm</Edit>
+  <New>DocumentLibraryForm</New>
+</FormTemplates>
+</file>
+
 <file path=customXml/itemProps1.xml><?xml version="1.0" encoding="utf-8"?>
 <ds:datastoreItem xmlns:ds="http://schemas.openxmlformats.org/officeDocument/2006/customXml" ds:itemID="{F7E70FC5-1855-47AB-8CE1-CB3C873A8988}">
   <ds:schemaRefs>
@@ -10736,14 +10761,6 @@
 </file>
 
 <file path=customXml/itemProps2.xml><?xml version="1.0" encoding="utf-8"?>
-<ds:datastoreItem xmlns:ds="http://schemas.openxmlformats.org/officeDocument/2006/customXml" ds:itemID="{30CB38EC-895A-4F8F-8F75-E263501ABB5A}">
-  <ds:schemaRefs>
-    <ds:schemaRef ds:uri="http://schemas.microsoft.com/sharepoint/v3/contenttype/forms"/>
-  </ds:schemaRefs>
-</ds:datastoreItem>
-</file>
-
-<file path=customXml/itemProps3.xml><?xml version="1.0" encoding="utf-8"?>
 <ds:datastoreItem xmlns:ds="http://schemas.openxmlformats.org/officeDocument/2006/customXml" ds:itemID="{5560E646-30AD-4BA0-97EA-A7A07DF5499A}">
   <ds:schemaRefs>
     <ds:schemaRef ds:uri="http://schemas.microsoft.com/office/2006/metadata/contentType"/>
@@ -10760,4 +10777,12 @@
     <ds:schemaRef ds:uri="http://schemas.microsoft.com/internal/obd"/>
   </ds:schemaRefs>
 </ds:datastoreItem>
+</file>
+
+<file path=customXml/itemProps3.xml><?xml version="1.0" encoding="utf-8"?>
+<ds:datastoreItem xmlns:ds="http://schemas.openxmlformats.org/officeDocument/2006/customXml" ds:itemID="{30CB38EC-895A-4F8F-8F75-E263501ABB5A}">
+  <ds:schemaRefs>
+    <ds:schemaRef ds:uri="http://schemas.microsoft.com/sharepoint/v3/contenttype/forms"/>
+  </ds:schemaRefs>
+</ds:datastoreItem>
 </file>
</xml_diff>